<commit_message>
Added link to git in presentation.
</commit_message>
<xml_diff>
--- a/Slides/DV02 - Reproducible Research and Exploratory Visualization with Matplotlib.pptx
+++ b/Slides/DV02 - Reproducible Research and Exploratory Visualization with Matplotlib.pptx
@@ -233,7 +233,7 @@
           </a:lstStyle>
           <a:p>
             <a:fld id="{A845046B-E3A6-4E43-9D24-8C38ABDF8202}" type="datetimeFigureOut">
-              <a:t>06/09/15</a:t>
+              <a:t>07/09/15</a:t>
             </a:fld>
             <a:endParaRPr lang="nl-NL"/>
           </a:p>
@@ -397,7 +397,7 @@
           <a:p>
             <a:fld id="{89AE0D14-A220-429F-BF6C-DF15AF8B03F9}" type="datetimeFigureOut">
               <a:rPr lang="nl-NL" smtClean="0"/>
-              <a:t>06/09/15</a:t>
+              <a:t>07/09/15</a:t>
             </a:fld>
             <a:endParaRPr lang="nl-NL"/>
           </a:p>
@@ -1979,7 +1979,7 @@
           <a:p>
             <a:fld id="{4ED2B493-C1EE-714C-B8A9-F38F4D8CE6E7}" type="datetimeFigureOut">
               <a:rPr lang="nl-NL" smtClean="0"/>
-              <a:t>06/09/15</a:t>
+              <a:t>07/09/15</a:t>
             </a:fld>
             <a:endParaRPr lang="nl-NL" dirty="0"/>
           </a:p>
@@ -3251,15 +3251,7 @@
           <a:p>
             <a:r>
               <a:rPr lang="nl-NL" dirty="0" smtClean="0"/>
-              <a:t>ADS ML – Week </a:t>
-            </a:r>
-            <a:r>
-              <a:rPr lang="nl-NL" dirty="0" smtClean="0"/>
-              <a:t>2</a:t>
-            </a:r>
-            <a:r>
-              <a:rPr lang="nl-NL" dirty="0" smtClean="0"/>
-              <a:t/>
+              <a:t>ADS ML – Week 2</a:t>
             </a:r>
             <a:br>
               <a:rPr lang="nl-NL" dirty="0" smtClean="0"/>
@@ -3419,6 +3411,46 @@
           </a:prstGeom>
         </p:spPr>
       </p:pic>
+      <p:sp>
+        <p:nvSpPr>
+          <p:cNvPr id="3" name="Rectangle 2"/>
+          <p:cNvSpPr/>
+          <p:nvPr/>
+        </p:nvSpPr>
+        <p:spPr>
+          <a:xfrm>
+            <a:off x="4723003" y="1151810"/>
+            <a:ext cx="3821404" cy="646331"/>
+          </a:xfrm>
+          <a:prstGeom prst="rect">
+            <a:avLst/>
+          </a:prstGeom>
+        </p:spPr>
+        <p:txBody>
+          <a:bodyPr wrap="none">
+            <a:spAutoFit/>
+          </a:bodyPr>
+          <a:lstStyle/>
+          <a:p>
+            <a:r>
+              <a:rPr lang="en-US" dirty="0">
+                <a:hlinkClick r:id="rId4"/>
+              </a:rPr>
+              <a:t>https://github.com/olafjanssen/ads-</a:t>
+            </a:r>
+            <a:r>
+              <a:rPr lang="en-US" dirty="0" smtClean="0">
+                <a:hlinkClick r:id="rId4"/>
+              </a:rPr>
+              <a:t>dv</a:t>
+            </a:r>
+            <a:endParaRPr lang="en-US" dirty="0" smtClean="0"/>
+          </a:p>
+          <a:p>
+            <a:endParaRPr lang="en-US" dirty="0"/>
+          </a:p>
+        </p:txBody>
+      </p:sp>
     </p:spTree>
     <p:extLst>
       <p:ext uri="{BB962C8B-B14F-4D97-AF65-F5344CB8AC3E}">
@@ -4496,7 +4528,6 @@
               <a:rPr lang="nl-NL" sz="2000" dirty="0" smtClean="0"/>
               <a:t> notebooks.</a:t>
             </a:r>
-            <a:endParaRPr lang="nl-NL" sz="2000" dirty="0" smtClean="0"/>
           </a:p>
           <a:p>
             <a:r>
@@ -4553,11 +4584,7 @@
             </a:r>
             <a:r>
               <a:rPr lang="nl-NL" sz="2000" dirty="0" smtClean="0"/>
-              <a:t> </a:t>
-            </a:r>
-            <a:r>
-              <a:rPr lang="nl-NL" sz="2000" dirty="0" smtClean="0"/>
-              <a:t>plot in Python </a:t>
+              <a:t> plot in Python </a:t>
             </a:r>
             <a:r>
               <a:rPr lang="nl-NL" sz="2000" dirty="0" err="1" smtClean="0"/>
@@ -4567,7 +4594,6 @@
               <a:rPr lang="nl-NL" sz="2000" dirty="0" smtClean="0"/>
               <a:t> Matplotlib. </a:t>
             </a:r>
-            <a:endParaRPr lang="nl-NL" sz="2000" dirty="0" smtClean="0"/>
           </a:p>
           <a:p>
             <a:r>
@@ -5277,7 +5303,6 @@
               <a:rPr lang="nl-NL" dirty="0"/>
               <a:t>. </a:t>
             </a:r>
-            <a:endParaRPr lang="nl-NL" dirty="0"/>
           </a:p>
         </p:txBody>
       </p:sp>

</xml_diff>

<commit_message>
Last updates before class starts.
</commit_message>
<xml_diff>
--- a/Slides/DV02 - Reproducible Research and Exploratory Visualization with Matplotlib.pptx
+++ b/Slides/DV02 - Reproducible Research and Exploratory Visualization with Matplotlib.pptx
@@ -5,10 +5,10 @@
     <p:sldMasterId id="2147483821" r:id="rId4"/>
   </p:sldMasterIdLst>
   <p:notesMasterIdLst>
-    <p:notesMasterId r:id="rId20"/>
+    <p:notesMasterId r:id="rId21"/>
   </p:notesMasterIdLst>
   <p:handoutMasterIdLst>
-    <p:handoutMasterId r:id="rId21"/>
+    <p:handoutMasterId r:id="rId22"/>
   </p:handoutMasterIdLst>
   <p:sldIdLst>
     <p:sldId id="290" r:id="rId5"/>
@@ -24,8 +24,9 @@
     <p:sldId id="339" r:id="rId15"/>
     <p:sldId id="310" r:id="rId16"/>
     <p:sldId id="340" r:id="rId17"/>
-    <p:sldId id="341" r:id="rId18"/>
-    <p:sldId id="342" r:id="rId19"/>
+    <p:sldId id="344" r:id="rId18"/>
+    <p:sldId id="341" r:id="rId19"/>
+    <p:sldId id="342" r:id="rId20"/>
   </p:sldIdLst>
   <p:sldSz cx="9144000" cy="5143500" type="screen16x9"/>
   <p:notesSz cx="6858000" cy="9144000"/>
@@ -142,6 +143,7 @@
             <p14:sldId id="339"/>
             <p14:sldId id="310"/>
             <p14:sldId id="340"/>
+            <p14:sldId id="344"/>
             <p14:sldId id="341"/>
             <p14:sldId id="342"/>
           </p14:sldIdLst>
@@ -1311,7 +1313,7 @@
           <a:p>
             <a:fld id="{5E450326-E5DD-4F11-958A-4BFAAE843C9B}" type="slidenum">
               <a:rPr lang="nl-NL" smtClean="0"/>
-              <a:t>14</a:t>
+              <a:t>15</a:t>
             </a:fld>
             <a:endParaRPr lang="nl-NL"/>
           </a:p>
@@ -3520,7 +3522,15 @@
             </a:br>
             <a:r>
               <a:rPr lang="en-US" dirty="0" smtClean="0"/>
-              <a:t>Parts of a Graph</a:t>
+              <a:t>All the Parts </a:t>
+            </a:r>
+            <a:r>
+              <a:rPr lang="en-US" dirty="0" smtClean="0"/>
+              <a:t>of a </a:t>
+            </a:r>
+            <a:r>
+              <a:rPr lang="en-US" dirty="0" smtClean="0"/>
+              <a:t>Chart</a:t>
             </a:r>
             <a:endParaRPr lang="en-US" dirty="0"/>
           </a:p>
@@ -3587,12 +3597,8 @@
               <a:t> of a </a:t>
             </a:r>
             <a:r>
-              <a:rPr lang="nl-NL" dirty="0" err="1"/>
-              <a:t>G</a:t>
-            </a:r>
-            <a:r>
-              <a:rPr lang="nl-NL" dirty="0" err="1" smtClean="0"/>
-              <a:t>raph</a:t>
+              <a:rPr lang="nl-NL" dirty="0" smtClean="0"/>
+              <a:t>Chart</a:t>
             </a:r>
             <a:endParaRPr lang="nl-NL" dirty="0"/>
           </a:p>
@@ -3947,6 +3953,75 @@
           </a:fontRef>
         </p:style>
       </p:cxnSp>
+      <p:sp>
+        <p:nvSpPr>
+          <p:cNvPr id="14" name="TextBox 13"/>
+          <p:cNvSpPr txBox="1"/>
+          <p:nvPr/>
+        </p:nvSpPr>
+        <p:spPr>
+          <a:xfrm>
+            <a:off x="434732" y="3181058"/>
+            <a:ext cx="1020644" cy="369332"/>
+          </a:xfrm>
+          <a:prstGeom prst="rect">
+            <a:avLst/>
+          </a:prstGeom>
+          <a:noFill/>
+        </p:spPr>
+        <p:txBody>
+          <a:bodyPr wrap="none" rtlCol="0">
+            <a:spAutoFit/>
+          </a:bodyPr>
+          <a:lstStyle/>
+          <a:p>
+            <a:r>
+              <a:rPr lang="en-US" dirty="0"/>
+              <a:t>t</a:t>
+            </a:r>
+            <a:r>
+              <a:rPr lang="en-US" dirty="0" smtClean="0"/>
+              <a:t>ick label</a:t>
+            </a:r>
+            <a:endParaRPr lang="en-US" dirty="0"/>
+          </a:p>
+        </p:txBody>
+      </p:sp>
+      <p:cxnSp>
+        <p:nvCxnSpPr>
+          <p:cNvPr id="4" name="Straight Arrow Connector 3"/>
+          <p:cNvCxnSpPr>
+            <a:stCxn id="14" idx="3"/>
+          </p:cNvCxnSpPr>
+          <p:nvPr/>
+        </p:nvCxnSpPr>
+        <p:spPr>
+          <a:xfrm>
+            <a:off x="1455376" y="3365724"/>
+            <a:ext cx="708328" cy="184666"/>
+          </a:xfrm>
+          <a:prstGeom prst="straightConnector1">
+            <a:avLst/>
+          </a:prstGeom>
+          <a:ln>
+            <a:tailEnd type="arrow"/>
+          </a:ln>
+        </p:spPr>
+        <p:style>
+          <a:lnRef idx="2">
+            <a:schemeClr val="accent1"/>
+          </a:lnRef>
+          <a:fillRef idx="0">
+            <a:schemeClr val="accent1"/>
+          </a:fillRef>
+          <a:effectRef idx="1">
+            <a:schemeClr val="accent1"/>
+          </a:effectRef>
+          <a:fontRef idx="minor">
+            <a:schemeClr val="tx1"/>
+          </a:fontRef>
+        </p:style>
+      </p:cxnSp>
     </p:spTree>
     <p:extLst>
       <p:ext uri="{BB962C8B-B14F-4D97-AF65-F5344CB8AC3E}">
@@ -4091,6 +4166,175 @@
           <a:p>
             <a:r>
               <a:rPr lang="en-US" dirty="0" smtClean="0"/>
+              <a:t>Chart Types</a:t>
+            </a:r>
+            <a:endParaRPr lang="en-US" dirty="0"/>
+          </a:p>
+        </p:txBody>
+      </p:sp>
+      <p:sp>
+        <p:nvSpPr>
+          <p:cNvPr id="3" name="Content Placeholder 2"/>
+          <p:cNvSpPr>
+            <a:spLocks noGrp="1"/>
+          </p:cNvSpPr>
+          <p:nvPr>
+            <p:ph sz="half" idx="1"/>
+          </p:nvPr>
+        </p:nvSpPr>
+        <p:spPr/>
+        <p:txBody>
+          <a:bodyPr>
+            <a:normAutofit/>
+          </a:bodyPr>
+          <a:lstStyle/>
+          <a:p>
+            <a:pPr marL="0" indent="0">
+              <a:buNone/>
+            </a:pPr>
+            <a:r>
+              <a:rPr lang="en-US" dirty="0" smtClean="0"/>
+              <a:t>Scatter Plots,</a:t>
+            </a:r>
+          </a:p>
+          <a:p>
+            <a:pPr marL="0" indent="0">
+              <a:buNone/>
+            </a:pPr>
+            <a:r>
+              <a:rPr lang="en-US" dirty="0" smtClean="0"/>
+              <a:t>Line Chart,</a:t>
+            </a:r>
+          </a:p>
+          <a:p>
+            <a:pPr marL="0" indent="0">
+              <a:buNone/>
+            </a:pPr>
+            <a:r>
+              <a:rPr lang="en-US" dirty="0" smtClean="0"/>
+              <a:t>Bar Chart / Histogram,</a:t>
+            </a:r>
+          </a:p>
+          <a:p>
+            <a:pPr marL="0" indent="0">
+              <a:buNone/>
+            </a:pPr>
+            <a:r>
+              <a:rPr lang="en-US" dirty="0" smtClean="0"/>
+              <a:t>Heat map</a:t>
+            </a:r>
+          </a:p>
+          <a:p>
+            <a:pPr marL="0" indent="0">
+              <a:buNone/>
+            </a:pPr>
+            <a:endParaRPr lang="en-US" dirty="0" smtClean="0"/>
+          </a:p>
+          <a:p>
+            <a:pPr marL="0" indent="0">
+              <a:buNone/>
+            </a:pPr>
+            <a:r>
+              <a:rPr lang="en-US" dirty="0" smtClean="0"/>
+              <a:t>Do you know what they are?</a:t>
+            </a:r>
+          </a:p>
+          <a:p>
+            <a:pPr marL="0" indent="0">
+              <a:buNone/>
+            </a:pPr>
+            <a:endParaRPr lang="en-US" dirty="0"/>
+          </a:p>
+        </p:txBody>
+      </p:sp>
+      <p:sp>
+        <p:nvSpPr>
+          <p:cNvPr id="4" name="Content Placeholder 3"/>
+          <p:cNvSpPr>
+            <a:spLocks noGrp="1"/>
+          </p:cNvSpPr>
+          <p:nvPr>
+            <p:ph sz="half" idx="2"/>
+          </p:nvPr>
+        </p:nvSpPr>
+        <p:spPr/>
+        <p:txBody>
+          <a:bodyPr>
+            <a:normAutofit/>
+          </a:bodyPr>
+          <a:lstStyle/>
+          <a:p>
+            <a:pPr marL="0" indent="0">
+              <a:buNone/>
+            </a:pPr>
+            <a:r>
+              <a:rPr lang="en-US" dirty="0"/>
+              <a:t>More on </a:t>
+            </a:r>
+            <a:r>
+              <a:rPr lang="en-US" dirty="0" smtClean="0"/>
+              <a:t>other types and when </a:t>
+            </a:r>
+            <a:r>
+              <a:rPr lang="en-US" dirty="0"/>
+              <a:t>to use what in the next few lessons.</a:t>
+            </a:r>
+          </a:p>
+          <a:p>
+            <a:pPr marL="0" indent="0">
+              <a:buNone/>
+            </a:pPr>
+            <a:endParaRPr lang="en-US" dirty="0"/>
+          </a:p>
+        </p:txBody>
+      </p:sp>
+    </p:spTree>
+    <p:extLst>
+      <p:ext uri="{BB962C8B-B14F-4D97-AF65-F5344CB8AC3E}">
+        <p14:creationId xmlns:p14="http://schemas.microsoft.com/office/powerpoint/2010/main" val="281032098"/>
+      </p:ext>
+    </p:extLst>
+  </p:cSld>
+  <p:clrMapOvr>
+    <a:masterClrMapping/>
+  </p:clrMapOvr>
+</p:sld>
+</file>
+
+<file path=ppt/slides/slide15.xml><?xml version="1.0" encoding="utf-8"?>
+<p:sld xmlns:a="http://schemas.openxmlformats.org/drawingml/2006/main" xmlns:r="http://schemas.openxmlformats.org/officeDocument/2006/relationships" xmlns:p="http://schemas.openxmlformats.org/presentationml/2006/main">
+  <p:cSld>
+    <p:spTree>
+      <p:nvGrpSpPr>
+        <p:cNvPr id="1" name=""/>
+        <p:cNvGrpSpPr/>
+        <p:nvPr/>
+      </p:nvGrpSpPr>
+      <p:grpSpPr>
+        <a:xfrm>
+          <a:off x="0" y="0"/>
+          <a:ext cx="0" cy="0"/>
+          <a:chOff x="0" y="0"/>
+          <a:chExt cx="0" cy="0"/>
+        </a:xfrm>
+      </p:grpSpPr>
+      <p:sp>
+        <p:nvSpPr>
+          <p:cNvPr id="2" name="Title 1"/>
+          <p:cNvSpPr>
+            <a:spLocks noGrp="1"/>
+          </p:cNvSpPr>
+          <p:nvPr>
+            <p:ph type="title"/>
+          </p:nvPr>
+        </p:nvSpPr>
+        <p:spPr/>
+        <p:txBody>
+          <a:bodyPr/>
+          <a:lstStyle/>
+          <a:p>
+            <a:r>
+              <a:rPr lang="en-US" dirty="0" smtClean="0"/>
               <a:t>Plotting with </a:t>
             </a:r>
             <a:r>
@@ -4243,7 +4487,7 @@
 </p:sld>
 </file>
 
-<file path=ppt/slides/slide15.xml><?xml version="1.0" encoding="utf-8"?>
+<file path=ppt/slides/slide16.xml><?xml version="1.0" encoding="utf-8"?>
 <p:sld xmlns:a="http://schemas.openxmlformats.org/drawingml/2006/main" xmlns:r="http://schemas.openxmlformats.org/officeDocument/2006/relationships" xmlns:p="http://schemas.openxmlformats.org/presentationml/2006/main">
   <p:cSld>
     <p:spTree>
@@ -4323,6 +4567,102 @@
             <a:r>
               <a:rPr lang="en-US" dirty="0" smtClean="0"/>
               <a:t>Add everything to you digital portfolio.</a:t>
+            </a:r>
+            <a:endParaRPr lang="en-US" dirty="0"/>
+          </a:p>
+        </p:txBody>
+      </p:sp>
+      <p:sp>
+        <p:nvSpPr>
+          <p:cNvPr id="4" name="Content Placeholder 3"/>
+          <p:cNvSpPr>
+            <a:spLocks noGrp="1"/>
+          </p:cNvSpPr>
+          <p:nvPr>
+            <p:ph sz="half" idx="2"/>
+          </p:nvPr>
+        </p:nvSpPr>
+        <p:spPr>
+          <a:ln>
+            <a:solidFill>
+              <a:schemeClr val="accent1"/>
+            </a:solidFill>
+          </a:ln>
+        </p:spPr>
+        <p:txBody>
+          <a:bodyPr/>
+          <a:lstStyle/>
+          <a:p>
+            <a:pPr marL="0" indent="0">
+              <a:buNone/>
+            </a:pPr>
+            <a:r>
+              <a:rPr lang="en-US" dirty="0" smtClean="0"/>
+              <a:t>Before week 4:</a:t>
+            </a:r>
+          </a:p>
+          <a:p>
+            <a:pPr marL="0" indent="0">
+              <a:buNone/>
+            </a:pPr>
+            <a:endParaRPr lang="en-US" dirty="0"/>
+          </a:p>
+          <a:p>
+            <a:pPr marL="0" indent="0">
+              <a:buNone/>
+            </a:pPr>
+            <a:r>
+              <a:rPr lang="en-US" dirty="0" smtClean="0"/>
+              <a:t>Watch lectures </a:t>
+            </a:r>
+            <a:r>
+              <a:rPr lang="en-US" b="1" dirty="0" smtClean="0"/>
+              <a:t>1a</a:t>
+            </a:r>
+            <a:r>
+              <a:rPr lang="en-US" dirty="0" smtClean="0"/>
+              <a:t> en </a:t>
+            </a:r>
+            <a:r>
+              <a:rPr lang="en-US" b="1" dirty="0" smtClean="0"/>
+              <a:t>2a</a:t>
+            </a:r>
+            <a:r>
+              <a:rPr lang="en-US" dirty="0" smtClean="0"/>
+              <a:t> of the </a:t>
+            </a:r>
+            <a:r>
+              <a:rPr lang="en-US" dirty="0" err="1" smtClean="0"/>
+              <a:t>Udacity</a:t>
+            </a:r>
+            <a:r>
+              <a:rPr lang="en-US" dirty="0"/>
+              <a:t> MOOC </a:t>
+            </a:r>
+            <a:r>
+              <a:rPr lang="en-US" b="1" dirty="0"/>
+              <a:t>Data Visualization and D3.</a:t>
+            </a:r>
+            <a:r>
+              <a:rPr lang="en-US" b="1" dirty="0" smtClean="0"/>
+              <a:t>js</a:t>
+            </a:r>
+            <a:r>
+              <a:rPr lang="en-US" b="1" dirty="0"/>
+              <a:t> </a:t>
+            </a:r>
+            <a:r>
+              <a:rPr lang="en-US" dirty="0" smtClean="0"/>
+              <a:t>on Visualization Fundamentals and</a:t>
+            </a:r>
+          </a:p>
+          <a:p>
+            <a:pPr marL="0" indent="0">
+              <a:buNone/>
+            </a:pPr>
+            <a:r>
+              <a:rPr lang="en-US" dirty="0" smtClean="0"/>
+              <a:t>Design Principles.</a:t>
             </a:r>
             <a:endParaRPr lang="en-US" dirty="0"/>
           </a:p>
@@ -5045,7 +5385,7 @@
         </p:nvSpPr>
         <p:spPr>
           <a:xfrm>
-            <a:off x="7322535" y="1749616"/>
+            <a:off x="7322535" y="1645029"/>
             <a:ext cx="1385152" cy="646331"/>
           </a:xfrm>
           <a:prstGeom prst="rect">
@@ -5063,6 +5403,7 @@
               <a:rPr lang="en-US" dirty="0" smtClean="0"/>
               <a:t>Presentation</a:t>
             </a:r>
+            <a:endParaRPr lang="en-US" dirty="0" smtClean="0"/>
           </a:p>
           <a:p>
             <a:endParaRPr lang="en-US" dirty="0"/>
@@ -5116,7 +5457,32 @@
           <a:p>
             <a:r>
               <a:rPr lang="en-US" dirty="0" smtClean="0"/>
-              <a:t>Reproducible Research</a:t>
+              <a:t>Reproducible </a:t>
+            </a:r>
+            <a:r>
+              <a:rPr lang="en-US" dirty="0" smtClean="0"/>
+              <a:t>Research</a:t>
+            </a:r>
+            <a:br>
+              <a:rPr lang="en-US" dirty="0" smtClean="0"/>
+            </a:br>
+            <a:r>
+              <a:rPr lang="en-US" dirty="0"/>
+              <a:t/>
+            </a:r>
+            <a:br>
+              <a:rPr lang="en-US" dirty="0"/>
+            </a:br>
+            <a:r>
+              <a:rPr lang="en-US" dirty="0" smtClean="0"/>
+              <a:t>Warning:</a:t>
+            </a:r>
+            <a:br>
+              <a:rPr lang="en-US" dirty="0" smtClean="0"/>
+            </a:br>
+            <a:r>
+              <a:rPr lang="en-US" dirty="0" smtClean="0"/>
+              <a:t> 	heavy text slides ahead</a:t>
             </a:r>
             <a:endParaRPr lang="en-US" dirty="0"/>
           </a:p>
@@ -6065,156 +6431,173 @@
             <p:ph idx="1"/>
           </p:nvPr>
         </p:nvSpPr>
-        <p:spPr/>
+        <p:spPr>
+          <a:xfrm>
+            <a:off x="457200" y="1076692"/>
+            <a:ext cx="8229600" cy="2874582"/>
+          </a:xfrm>
+        </p:spPr>
         <p:txBody>
           <a:bodyPr>
-            <a:normAutofit fontScale="70000" lnSpcReduction="20000"/>
+            <a:noAutofit/>
           </a:bodyPr>
           <a:lstStyle/>
           <a:p>
             <a:r>
-              <a:rPr lang="en-US" dirty="0" smtClean="0"/>
+              <a:rPr lang="en-US" sz="1800" dirty="0" smtClean="0"/>
               <a:t>Use </a:t>
             </a:r>
             <a:r>
-              <a:rPr lang="en-US" dirty="0" err="1"/>
+              <a:rPr lang="en-US" sz="1800" dirty="0" err="1"/>
               <a:t>iPython</a:t>
             </a:r>
             <a:r>
-              <a:rPr lang="en-US" dirty="0"/>
+              <a:rPr lang="en-US" sz="1800" dirty="0"/>
               <a:t> Notebooks to combine your </a:t>
             </a:r>
             <a:r>
-              <a:rPr lang="en-US" dirty="0" smtClean="0"/>
+              <a:rPr lang="en-US" sz="1800" dirty="0" smtClean="0"/>
               <a:t>report with source </a:t>
             </a:r>
             <a:r>
-              <a:rPr lang="en-US" dirty="0"/>
+              <a:rPr lang="en-US" sz="1800" dirty="0"/>
               <a:t>code and its </a:t>
             </a:r>
             <a:r>
-              <a:rPr lang="en-US" dirty="0" smtClean="0"/>
+              <a:rPr lang="en-US" sz="1800" dirty="0" smtClean="0"/>
               <a:t>output.</a:t>
             </a:r>
           </a:p>
           <a:p>
             <a:r>
-              <a:rPr lang="en-US" dirty="0" smtClean="0"/>
+              <a:rPr lang="en-US" sz="1800" dirty="0" smtClean="0"/>
               <a:t>Use </a:t>
             </a:r>
             <a:r>
-              <a:rPr lang="en-US" dirty="0"/>
+              <a:rPr lang="en-US" sz="1800" dirty="0"/>
               <a:t>a version control system (</a:t>
             </a:r>
             <a:r>
-              <a:rPr lang="en-US" dirty="0" err="1"/>
+              <a:rPr lang="en-US" sz="1800" dirty="0" err="1"/>
               <a:t>Git</a:t>
             </a:r>
             <a:r>
-              <a:rPr lang="en-US" dirty="0"/>
+              <a:rPr lang="en-US" sz="1800" dirty="0"/>
               <a:t> is recommended</a:t>
             </a:r>
             <a:r>
-              <a:rPr lang="en-US" dirty="0" smtClean="0"/>
+              <a:rPr lang="en-US" sz="1800" dirty="0" smtClean="0"/>
               <a:t>).</a:t>
             </a:r>
           </a:p>
           <a:p>
             <a:r>
-              <a:rPr lang="en-US" dirty="0" smtClean="0"/>
+              <a:rPr lang="en-US" sz="1800" dirty="0" smtClean="0"/>
               <a:t>Include </a:t>
             </a:r>
             <a:r>
-              <a:rPr lang="en-US" dirty="0"/>
+              <a:rPr lang="en-US" sz="1800" dirty="0"/>
               <a:t>all data used in the data analysis in its rawest </a:t>
             </a:r>
             <a:r>
-              <a:rPr lang="en-US" dirty="0" smtClean="0"/>
+              <a:rPr lang="en-US" sz="1800" dirty="0" smtClean="0"/>
               <a:t>form and include a codebook when possible.</a:t>
             </a:r>
           </a:p>
           <a:p>
             <a:r>
-              <a:rPr lang="en-US" dirty="0" smtClean="0"/>
+              <a:rPr lang="en-US" sz="1800" dirty="0" smtClean="0"/>
               <a:t>You </a:t>
             </a:r>
             <a:r>
-              <a:rPr lang="en-US" dirty="0"/>
+              <a:rPr lang="en-US" sz="1800" dirty="0"/>
               <a:t>will NOT change the raw data by </a:t>
             </a:r>
             <a:r>
-              <a:rPr lang="en-US" dirty="0" smtClean="0"/>
+              <a:rPr lang="en-US" sz="1800" dirty="0" smtClean="0"/>
               <a:t>hand but in a Notebook.</a:t>
             </a:r>
           </a:p>
           <a:p>
             <a:r>
-              <a:rPr lang="en-US" dirty="0" smtClean="0"/>
+              <a:rPr lang="en-US" sz="1800" dirty="0" smtClean="0"/>
               <a:t>You </a:t>
             </a:r>
             <a:r>
-              <a:rPr lang="en-US" dirty="0"/>
+              <a:rPr lang="en-US" sz="1800" dirty="0"/>
               <a:t>will NOT use a GUI based program to edit or visualize data and include it as reproducible research. You can use such tools for data exploration or to produce more esthetic visualizations based on reproducible </a:t>
             </a:r>
             <a:r>
-              <a:rPr lang="en-US" dirty="0" smtClean="0"/>
+              <a:rPr lang="en-US" sz="1800" dirty="0" smtClean="0"/>
               <a:t>visualizations.</a:t>
             </a:r>
           </a:p>
           <a:p>
             <a:r>
-              <a:rPr lang="en-US" dirty="0" smtClean="0"/>
+              <a:rPr lang="en-US" sz="1800" dirty="0" smtClean="0"/>
               <a:t>Intermediate </a:t>
             </a:r>
             <a:r>
-              <a:rPr lang="en-US" dirty="0"/>
+              <a:rPr lang="en-US" sz="1800" dirty="0"/>
               <a:t>results </a:t>
             </a:r>
             <a:r>
-              <a:rPr lang="en-US" dirty="0" smtClean="0"/>
-              <a:t>can only be used if there is a Notebook creating them.</a:t>
-            </a:r>
-          </a:p>
-          <a:p>
-            <a:endParaRPr lang="en-US" dirty="0" smtClean="0"/>
-          </a:p>
-          <a:p>
-            <a:pPr marL="0" indent="0">
-              <a:buNone/>
-            </a:pPr>
-            <a:r>
-              <a:rPr lang="en-US" sz="1900" dirty="0" smtClean="0"/>
+              <a:rPr lang="en-US" sz="1800" dirty="0" smtClean="0"/>
+              <a:t>can only be used if there is a Notebook creating them</a:t>
+            </a:r>
+            <a:r>
+              <a:rPr lang="en-US" sz="1800" dirty="0" smtClean="0"/>
+              <a:t>.</a:t>
+            </a:r>
+            <a:endParaRPr lang="en-US" sz="1800" dirty="0"/>
+          </a:p>
+          <a:p>
+            <a:endParaRPr lang="en-US" sz="1800" dirty="0"/>
+          </a:p>
+        </p:txBody>
+      </p:sp>
+      <p:sp>
+        <p:nvSpPr>
+          <p:cNvPr id="3" name="Rectangle 2"/>
+          <p:cNvSpPr/>
+          <p:nvPr/>
+        </p:nvSpPr>
+        <p:spPr>
+          <a:xfrm>
+            <a:off x="1499380" y="4404836"/>
+            <a:ext cx="6420865" cy="461665"/>
+          </a:xfrm>
+          <a:prstGeom prst="rect">
+            <a:avLst/>
+          </a:prstGeom>
+        </p:spPr>
+        <p:txBody>
+          <a:bodyPr wrap="square">
+            <a:spAutoFit/>
+          </a:bodyPr>
+          <a:lstStyle/>
+          <a:p>
+            <a:r>
+              <a:rPr lang="en-US" sz="1200" dirty="0"/>
               <a:t>Based </a:t>
             </a:r>
             <a:r>
-              <a:rPr lang="en-US" sz="1900" dirty="0" err="1" smtClean="0"/>
+              <a:rPr lang="en-US" sz="1200" dirty="0" err="1"/>
               <a:t>on:</a:t>
             </a:r>
             <a:r>
-              <a:rPr lang="en-US" sz="1900" dirty="0" err="1" smtClean="0">
+              <a:rPr lang="en-US" sz="1200" dirty="0" err="1">
                 <a:hlinkClick r:id="rId2"/>
               </a:rPr>
               <a:t>https</a:t>
             </a:r>
             <a:r>
-              <a:rPr lang="en-US" sz="1900" dirty="0">
+              <a:rPr lang="en-US" sz="1200" dirty="0">
                 <a:hlinkClick r:id="rId2"/>
               </a:rPr>
-              <a:t>://github.com/rdpeng/courses/blob/master/05_ReproducibleResearch/lectures/</a:t>
-            </a:r>
-            <a:r>
-              <a:rPr lang="en-US" sz="1900" dirty="0" smtClean="0">
-                <a:hlinkClick r:id="rId2"/>
-              </a:rPr>
-              <a:t>Checklist.pdf</a:t>
-            </a:r>
-            <a:endParaRPr lang="en-US" sz="1900" dirty="0" smtClean="0"/>
-          </a:p>
-          <a:p>
-            <a:endParaRPr lang="en-US" dirty="0"/>
-          </a:p>
-          <a:p>
-            <a:endParaRPr lang="en-US" dirty="0"/>
+              <a:t>://github.com/rdpeng/courses/blob/master/05_ReproducibleResearch/lectures/Checklist.pdf</a:t>
+            </a:r>
+            <a:endParaRPr lang="en-US" sz="1200" dirty="0"/>
           </a:p>
         </p:txBody>
       </p:sp>

</xml_diff>